<commit_message>
more updates to presentation
</commit_message>
<xml_diff>
--- a/docs/Capstone Presentation.pptx
+++ b/docs/Capstone Presentation.pptx
@@ -6989,7 +6989,7 @@
         </p:nvSpPr>
         <p:spPr>
           <a:xfrm>
-            <a:off x="8490857" y="5291688"/>
+            <a:off x="7651210" y="5532437"/>
             <a:ext cx="3470987" cy="1325563"/>
           </a:xfrm>
           <a:effectLst>
@@ -7153,57 +7153,6 @@
           </a:p>
         </p:txBody>
       </p:sp>
-      <p:sp>
-        <p:nvSpPr>
-          <p:cNvPr id="6" name="TextBox 5">
-            <a:extLst>
-              <a:ext uri="{FF2B5EF4-FFF2-40B4-BE49-F238E27FC236}">
-                <a16:creationId xmlns:a16="http://schemas.microsoft.com/office/drawing/2014/main" id="{0BC9EFDB-755A-4CD5-96E6-FF20EA0C245A}"/>
-              </a:ext>
-            </a:extLst>
-          </p:cNvPr>
-          <p:cNvSpPr txBox="1"/>
-          <p:nvPr/>
-        </p:nvSpPr>
-        <p:spPr>
-          <a:xfrm>
-            <a:off x="7769185" y="5692859"/>
-            <a:ext cx="721672" cy="523220"/>
-          </a:xfrm>
-          <a:prstGeom prst="rect">
-            <a:avLst/>
-          </a:prstGeom>
-          <a:noFill/>
-          <a:effectLst>
-            <a:outerShdw blurRad="50800" dist="38100" dir="2700000" algn="tl" rotWithShape="0">
-              <a:prstClr val="black">
-                <a:alpha val="40000"/>
-              </a:prstClr>
-            </a:outerShdw>
-          </a:effectLst>
-        </p:spPr>
-        <p:txBody>
-          <a:bodyPr wrap="none" rtlCol="0">
-            <a:spAutoFit/>
-          </a:bodyPr>
-          <a:lstStyle/>
-          <a:p>
-            <a:r>
-              <a:rPr lang="en-US" sz="2800" dirty="0">
-                <a:solidFill>
-                  <a:schemeClr val="accent6"/>
-                </a:solidFill>
-              </a:rPr>
-              <a:t>any</a:t>
-            </a:r>
-            <a:endParaRPr lang="en-CA" sz="2800" dirty="0">
-              <a:solidFill>
-                <a:schemeClr val="accent6"/>
-              </a:solidFill>
-            </a:endParaRPr>
-          </a:p>
-        </p:txBody>
-      </p:sp>
     </p:spTree>
     <p:extLst>
       <p:ext uri="{BB962C8B-B14F-4D97-AF65-F5344CB8AC3E}">
@@ -7407,6 +7356,10 @@
           </p:nvPr>
         </p:nvSpPr>
         <p:spPr>
+          <a:xfrm>
+            <a:off x="838200" y="365125"/>
+            <a:ext cx="10515600" cy="1325563"/>
+          </a:xfrm>
           <a:effectLst>
             <a:outerShdw blurRad="50800" dist="38100" dir="2700000" algn="tl" rotWithShape="0">
               <a:prstClr val="black">
@@ -7502,8 +7455,8 @@
         </p:nvSpPr>
         <p:spPr>
           <a:xfrm>
-            <a:off x="6643868" y="1825625"/>
-            <a:ext cx="4201610" cy="1754326"/>
+            <a:off x="5841506" y="2767280"/>
+            <a:ext cx="5726098" cy="1323439"/>
           </a:xfrm>
           <a:prstGeom prst="rect">
             <a:avLst/>
@@ -7516,6 +7469,7 @@
           </a:bodyPr>
           <a:lstStyle/>
           <a:p>
+            <a:pPr algn="ctr"/>
             <a:r>
               <a:rPr lang="en-US" sz="2800" b="1" dirty="0">
                 <a:solidFill>
@@ -7523,20 +7477,14 @@
                 </a:solidFill>
                 <a:latin typeface="+mj-lt"/>
               </a:rPr>
-              <a:t>Solution</a:t>
-            </a:r>
-            <a:r>
-              <a:rPr lang="en-US" sz="2800" b="1" dirty="0">
-                <a:latin typeface="+mj-lt"/>
-              </a:rPr>
-              <a:t>:</a:t>
-            </a:r>
-          </a:p>
-          <a:p>
-            <a:pPr marL="285750" indent="-285750">
-              <a:buFont typeface="Arial" panose="020B0604020202020204" pitchFamily="34" charset="0"/>
-              <a:buChar char="•"/>
-            </a:pPr>
+              <a:t>Solution!</a:t>
+            </a:r>
+            <a:endParaRPr lang="en-US" sz="2800" b="1" dirty="0">
+              <a:latin typeface="+mj-lt"/>
+            </a:endParaRPr>
+          </a:p>
+          <a:p>
+            <a:pPr algn="ctr"/>
             <a:r>
               <a:rPr lang="en-US" sz="2800" dirty="0">
                 <a:latin typeface="+mj-lt"/>
@@ -7645,7 +7593,7 @@
             <p:ph idx="1"/>
             <p:extLst>
               <p:ext uri="{D42A27DB-BD31-4B8C-83A1-F6EECF244321}">
-                <p14:modId xmlns:p14="http://schemas.microsoft.com/office/powerpoint/2010/main" val="449111369"/>
+                <p14:modId xmlns:p14="http://schemas.microsoft.com/office/powerpoint/2010/main" val="3303978096"/>
               </p:ext>
             </p:extLst>
           </p:nvPr>
@@ -7718,7 +7666,7 @@
                   <a:tcPr marL="68580" marR="68580" marT="0" marB="0" anchor="ctr">
                     <a:lnR w="12700" cap="flat" cmpd="sng" algn="ctr">
                       <a:solidFill>
-                        <a:schemeClr val="tx1"/>
+                        <a:schemeClr val="accent1"/>
                       </a:solidFill>
                       <a:prstDash val="solid"/>
                       <a:round/>
@@ -7772,7 +7720,7 @@
                   <a:tcPr marL="68580" marR="68580" marT="0" marB="0" anchor="ctr">
                     <a:lnL w="12700" cap="flat" cmpd="sng" algn="ctr">
                       <a:solidFill>
-                        <a:schemeClr val="tx1"/>
+                        <a:schemeClr val="accent1"/>
                       </a:solidFill>
                       <a:prstDash val="solid"/>
                       <a:round/>
@@ -8417,7 +8365,7 @@
                         </a:spcAft>
                       </a:pPr>
                       <a:r>
-                        <a:rPr lang="en-US" sz="3200">
+                        <a:rPr lang="en-US" sz="3200" dirty="0">
                           <a:effectLst/>
                         </a:rPr>
                         <a:t>Team Statistics</a:t>
@@ -8613,13 +8561,14 @@
           </a:bodyPr>
           <a:lstStyle/>
           <a:p>
+            <a:pPr algn="ctr"/>
             <a:r>
               <a:rPr lang="en-US" dirty="0">
                 <a:solidFill>
                   <a:schemeClr val="accent6"/>
                 </a:solidFill>
               </a:rPr>
-              <a:t>Project Plan : Deliverables</a:t>
+              <a:t>Project Plan</a:t>
             </a:r>
           </a:p>
         </p:txBody>
@@ -8639,7 +8588,7 @@
         <p:spPr>
           <a:xfrm>
             <a:off x="754602" y="1614243"/>
-            <a:ext cx="10537793" cy="3739485"/>
+            <a:ext cx="10537793" cy="3831818"/>
           </a:xfrm>
           <a:prstGeom prst="rect">
             <a:avLst/>
@@ -8658,7 +8607,7 @@
               </a:lnSpc>
             </a:pPr>
             <a:r>
-              <a:rPr lang="en-US" sz="2400" b="1" dirty="0">
+              <a:rPr lang="en-US" sz="2800" b="1" dirty="0">
                 <a:solidFill>
                   <a:schemeClr val="accent6"/>
                 </a:solidFill>
@@ -9430,7 +9379,7 @@
             </a:pPr>
             <a:r>
               <a:rPr lang="en-CA" dirty="0"/>
-              <a:t>unanimous decisions</a:t>
+              <a:t>unanimous decision making</a:t>
             </a:r>
           </a:p>
           <a:p>
@@ -9460,7 +9409,7 @@
             </a:pPr>
             <a:r>
               <a:rPr lang="en-CA" dirty="0"/>
-              <a:t>Milestone</a:t>
+              <a:t>Milestones</a:t>
             </a:r>
           </a:p>
           <a:p>
@@ -9807,11 +9756,7 @@
             </a:pPr>
             <a:r>
               <a:rPr lang="en-US" dirty="0"/>
-              <a:t>Creating Folder </a:t>
-            </a:r>
-            <a:r>
-              <a:rPr lang="en-US" dirty="0" err="1"/>
-              <a:t>Heirarchy</a:t>
+              <a:t>Creating Folder Hierarchy</a:t>
             </a:r>
             <a:endParaRPr lang="en-CA" dirty="0"/>
           </a:p>

</xml_diff>